<commit_message>
add topics struct and enum into presentation
</commit_message>
<xml_diff>
--- a/Prezentace/PGM_12_R.pptx
+++ b/Prezentace/PGM_12_R.pptx
@@ -11,11 +11,13 @@
     <p:sldId id="271" r:id="rId5"/>
     <p:sldId id="272" r:id="rId6"/>
     <p:sldId id="268" r:id="rId7"/>
-    <p:sldId id="273" r:id="rId8"/>
-    <p:sldId id="274" r:id="rId9"/>
-    <p:sldId id="275" r:id="rId10"/>
-    <p:sldId id="276" r:id="rId11"/>
-    <p:sldId id="277" r:id="rId12"/>
+    <p:sldId id="278" r:id="rId8"/>
+    <p:sldId id="279" r:id="rId9"/>
+    <p:sldId id="273" r:id="rId10"/>
+    <p:sldId id="274" r:id="rId11"/>
+    <p:sldId id="275" r:id="rId12"/>
+    <p:sldId id="276" r:id="rId13"/>
+    <p:sldId id="277" r:id="rId14"/>
   </p:sldIdLst>
   <p:sldSz cx="12192000" cy="6858000"/>
   <p:notesSz cx="6858000" cy="9144000"/>
@@ -880,7 +882,7 @@
             <a:fld id="{B61BEF0D-F0BB-DE4B-95CE-6DB70DBA9567}" type="datetimeFigureOut">
               <a:rPr lang="en-US" dirty="0"/>
               <a:pPr/>
-              <a:t>1/23/2021</a:t>
+              <a:t>1/26/2021</a:t>
             </a:fld>
             <a:endParaRPr lang="en-US" dirty="0"/>
           </a:p>
@@ -1128,7 +1130,7 @@
             <a:fld id="{B61BEF0D-F0BB-DE4B-95CE-6DB70DBA9567}" type="datetimeFigureOut">
               <a:rPr lang="en-US" dirty="0"/>
               <a:pPr/>
-              <a:t>1/23/2021</a:t>
+              <a:t>1/26/2021</a:t>
             </a:fld>
             <a:endParaRPr lang="en-US" dirty="0"/>
           </a:p>
@@ -1439,7 +1441,7 @@
             <a:fld id="{B61BEF0D-F0BB-DE4B-95CE-6DB70DBA9567}" type="datetimeFigureOut">
               <a:rPr lang="en-US" dirty="0"/>
               <a:pPr/>
-              <a:t>1/23/2021</a:t>
+              <a:t>1/26/2021</a:t>
             </a:fld>
             <a:endParaRPr lang="en-US" dirty="0"/>
           </a:p>
@@ -1769,7 +1771,7 @@
             <a:fld id="{B61BEF0D-F0BB-DE4B-95CE-6DB70DBA9567}" type="datetimeFigureOut">
               <a:rPr lang="en-US" dirty="0"/>
               <a:pPr/>
-              <a:t>1/23/2021</a:t>
+              <a:t>1/26/2021</a:t>
             </a:fld>
             <a:endParaRPr lang="en-US" dirty="0"/>
           </a:p>
@@ -2080,7 +2082,7 @@
             <a:fld id="{B61BEF0D-F0BB-DE4B-95CE-6DB70DBA9567}" type="datetimeFigureOut">
               <a:rPr lang="en-US" dirty="0"/>
               <a:pPr/>
-              <a:t>1/23/2021</a:t>
+              <a:t>1/26/2021</a:t>
             </a:fld>
             <a:endParaRPr lang="en-US" dirty="0"/>
           </a:p>
@@ -2470,7 +2472,7 @@
             <a:fld id="{B61BEF0D-F0BB-DE4B-95CE-6DB70DBA9567}" type="datetimeFigureOut">
               <a:rPr lang="en-US" dirty="0"/>
               <a:pPr/>
-              <a:t>1/23/2021</a:t>
+              <a:t>1/26/2021</a:t>
             </a:fld>
             <a:endParaRPr lang="en-US" dirty="0"/>
           </a:p>
@@ -2636,7 +2638,7 @@
           <a:p>
             <a:fld id="{55C6B4A9-1611-4792-9094-5F34BCA07E0B}" type="datetimeFigureOut">
               <a:rPr lang="en-US" dirty="0"/>
-              <a:t>1/23/2021</a:t>
+              <a:t>1/26/2021</a:t>
             </a:fld>
             <a:endParaRPr lang="en-US" dirty="0"/>
           </a:p>
@@ -2812,7 +2814,7 @@
             <a:fld id="{B61BEF0D-F0BB-DE4B-95CE-6DB70DBA9567}" type="datetimeFigureOut">
               <a:rPr lang="en-US" dirty="0"/>
               <a:pPr/>
-              <a:t>1/23/2021</a:t>
+              <a:t>1/26/2021</a:t>
             </a:fld>
             <a:endParaRPr lang="en-US" dirty="0"/>
           </a:p>
@@ -2978,7 +2980,7 @@
           <a:p>
             <a:fld id="{42A54C80-263E-416B-A8E0-580EDEADCBDC}" type="datetimeFigureOut">
               <a:rPr lang="en-US" dirty="0"/>
-              <a:t>1/23/2021</a:t>
+              <a:t>1/26/2021</a:t>
             </a:fld>
             <a:endParaRPr lang="en-US" dirty="0"/>
           </a:p>
@@ -3221,7 +3223,7 @@
             <a:fld id="{B61BEF0D-F0BB-DE4B-95CE-6DB70DBA9567}" type="datetimeFigureOut">
               <a:rPr lang="en-US" dirty="0"/>
               <a:pPr/>
-              <a:t>1/23/2021</a:t>
+              <a:t>1/26/2021</a:t>
             </a:fld>
             <a:endParaRPr lang="en-US" dirty="0"/>
           </a:p>
@@ -3449,7 +3451,7 @@
           <a:p>
             <a:fld id="{42A54C80-263E-416B-A8E0-580EDEADCBDC}" type="datetimeFigureOut">
               <a:rPr lang="en-US" dirty="0"/>
-              <a:t>1/23/2021</a:t>
+              <a:t>1/26/2021</a:t>
             </a:fld>
             <a:endParaRPr lang="en-US" dirty="0"/>
           </a:p>
@@ -3819,7 +3821,7 @@
             <a:fld id="{B61BEF0D-F0BB-DE4B-95CE-6DB70DBA9567}" type="datetimeFigureOut">
               <a:rPr lang="en-US" dirty="0"/>
               <a:pPr/>
-              <a:t>1/23/2021</a:t>
+              <a:t>1/26/2021</a:t>
             </a:fld>
             <a:endParaRPr lang="en-US" dirty="0"/>
           </a:p>
@@ -3939,7 +3941,7 @@
             <a:fld id="{B61BEF0D-F0BB-DE4B-95CE-6DB70DBA9567}" type="datetimeFigureOut">
               <a:rPr lang="en-US" dirty="0"/>
               <a:pPr/>
-              <a:t>1/23/2021</a:t>
+              <a:t>1/26/2021</a:t>
             </a:fld>
             <a:endParaRPr lang="en-US" dirty="0"/>
           </a:p>
@@ -4031,7 +4033,7 @@
             <a:fld id="{B61BEF0D-F0BB-DE4B-95CE-6DB70DBA9567}" type="datetimeFigureOut">
               <a:rPr lang="en-US" dirty="0"/>
               <a:pPr/>
-              <a:t>1/23/2021</a:t>
+              <a:t>1/26/2021</a:t>
             </a:fld>
             <a:endParaRPr lang="en-US" dirty="0"/>
           </a:p>
@@ -4282,7 +4284,7 @@
           <a:p>
             <a:fld id="{42A54C80-263E-416B-A8E0-580EDEADCBDC}" type="datetimeFigureOut">
               <a:rPr lang="en-US" dirty="0"/>
-              <a:t>1/23/2021</a:t>
+              <a:t>1/26/2021</a:t>
             </a:fld>
             <a:endParaRPr lang="en-US" dirty="0"/>
           </a:p>
@@ -4584,7 +4586,7 @@
             <a:fld id="{B61BEF0D-F0BB-DE4B-95CE-6DB70DBA9567}" type="datetimeFigureOut">
               <a:rPr lang="en-US" dirty="0"/>
               <a:pPr/>
-              <a:t>1/23/2021</a:t>
+              <a:t>1/26/2021</a:t>
             </a:fld>
             <a:endParaRPr lang="en-US" dirty="0"/>
           </a:p>
@@ -5282,7 +5284,7 @@
             <a:fld id="{B61BEF0D-F0BB-DE4B-95CE-6DB70DBA9567}" type="datetimeFigureOut">
               <a:rPr lang="en-US" dirty="0"/>
               <a:pPr/>
-              <a:t>1/23/2021</a:t>
+              <a:t>1/26/2021</a:t>
             </a:fld>
             <a:endParaRPr lang="en-US" dirty="0"/>
           </a:p>
@@ -5904,6 +5906,329 @@
           <p:cNvPr id="2" name="Nadpis 1">
             <a:extLst>
               <a:ext uri="{FF2B5EF4-FFF2-40B4-BE49-F238E27FC236}">
+                <a16:creationId xmlns:a16="http://schemas.microsoft.com/office/drawing/2014/main" id="{B787E4E9-AD40-4F51-B9CF-ABA3E7FFAB1B}"/>
+              </a:ext>
+            </a:extLst>
+          </p:cNvPr>
+          <p:cNvSpPr>
+            <a:spLocks noGrp="1"/>
+          </p:cNvSpPr>
+          <p:nvPr>
+            <p:ph type="title"/>
+          </p:nvPr>
+        </p:nvSpPr>
+        <p:spPr>
+          <a:xfrm>
+            <a:off x="677334" y="609600"/>
+            <a:ext cx="8596668" cy="829456"/>
+          </a:xfrm>
+        </p:spPr>
+        <p:txBody>
+          <a:bodyPr/>
+          <a:lstStyle/>
+          <a:p>
+            <a:r>
+              <a:rPr lang="cs-CZ" dirty="0"/>
+              <a:t>Přehled používaných symbolů</a:t>
+            </a:r>
+          </a:p>
+        </p:txBody>
+      </p:sp>
+      <p:pic>
+        <p:nvPicPr>
+          <p:cNvPr id="4" name="Zástupný obsah 4">
+            <a:extLst>
+              <a:ext uri="{FF2B5EF4-FFF2-40B4-BE49-F238E27FC236}">
+                <a16:creationId xmlns:a16="http://schemas.microsoft.com/office/drawing/2014/main" id="{3F24D363-0852-44A5-8A3D-C27141964298}"/>
+              </a:ext>
+            </a:extLst>
+          </p:cNvPr>
+          <p:cNvPicPr>
+            <a:picLocks noGrp="1" noChangeAspect="1"/>
+          </p:cNvPicPr>
+          <p:nvPr>
+            <p:ph idx="1"/>
+          </p:nvPr>
+        </p:nvPicPr>
+        <p:blipFill>
+          <a:blip r:embed="rId2"/>
+          <a:stretch>
+            <a:fillRect/>
+          </a:stretch>
+        </p:blipFill>
+        <p:spPr>
+          <a:xfrm>
+            <a:off x="1482693" y="1439056"/>
+            <a:ext cx="6985949" cy="5043874"/>
+          </a:xfrm>
+        </p:spPr>
+      </p:pic>
+      <p:sp>
+        <p:nvSpPr>
+          <p:cNvPr id="5" name="Šipka: doleva 4">
+            <a:extLst>
+              <a:ext uri="{FF2B5EF4-FFF2-40B4-BE49-F238E27FC236}">
+                <a16:creationId xmlns:a16="http://schemas.microsoft.com/office/drawing/2014/main" id="{55657F4F-F11E-4ADC-A9DF-E4CF2AF41871}"/>
+              </a:ext>
+            </a:extLst>
+          </p:cNvPr>
+          <p:cNvSpPr/>
+          <p:nvPr/>
+        </p:nvSpPr>
+        <p:spPr>
+          <a:xfrm>
+            <a:off x="8468642" y="1772313"/>
+            <a:ext cx="2509687" cy="1459120"/>
+          </a:xfrm>
+          <a:prstGeom prst="leftArrow">
+            <a:avLst/>
+          </a:prstGeom>
+        </p:spPr>
+        <p:style>
+          <a:lnRef idx="2">
+            <a:schemeClr val="accent1">
+              <a:shade val="50000"/>
+            </a:schemeClr>
+          </a:lnRef>
+          <a:fillRef idx="1">
+            <a:schemeClr val="accent1"/>
+          </a:fillRef>
+          <a:effectRef idx="0">
+            <a:schemeClr val="accent1"/>
+          </a:effectRef>
+          <a:fontRef idx="minor">
+            <a:schemeClr val="lt1"/>
+          </a:fontRef>
+        </p:style>
+        <p:txBody>
+          <a:bodyPr rtlCol="0" anchor="ctr"/>
+          <a:lstStyle/>
+          <a:p>
+            <a:pPr algn="ctr"/>
+            <a:r>
+              <a:rPr lang="cs-CZ" dirty="0"/>
+              <a:t>Používáme i pro vstupní instrukce</a:t>
+            </a:r>
+          </a:p>
+        </p:txBody>
+      </p:sp>
+    </p:spTree>
+    <p:extLst>
+      <p:ext uri="{BB962C8B-B14F-4D97-AF65-F5344CB8AC3E}">
+        <p14:creationId xmlns:p14="http://schemas.microsoft.com/office/powerpoint/2010/main" val="2761015398"/>
+      </p:ext>
+    </p:extLst>
+  </p:cSld>
+  <p:clrMapOvr>
+    <a:masterClrMapping/>
+  </p:clrMapOvr>
+</p:sld>
+</file>
+
+<file path=ppt/slides/slide11.xml><?xml version="1.0" encoding="utf-8"?>
+<p:sld xmlns:a="http://schemas.openxmlformats.org/drawingml/2006/main" xmlns:r="http://schemas.openxmlformats.org/officeDocument/2006/relationships" xmlns:p="http://schemas.openxmlformats.org/presentationml/2006/main">
+  <p:cSld>
+    <p:bg>
+      <p:bgPr>
+        <a:solidFill>
+          <a:schemeClr val="bg1"/>
+        </a:solidFill>
+        <a:effectLst/>
+      </p:bgPr>
+    </p:bg>
+    <p:spTree>
+      <p:nvGrpSpPr>
+        <p:cNvPr id="1" name=""/>
+        <p:cNvGrpSpPr/>
+        <p:nvPr/>
+      </p:nvGrpSpPr>
+      <p:grpSpPr>
+        <a:xfrm>
+          <a:off x="0" y="0"/>
+          <a:ext cx="0" cy="0"/>
+          <a:chOff x="0" y="0"/>
+          <a:chExt cx="0" cy="0"/>
+        </a:xfrm>
+      </p:grpSpPr>
+      <p:sp>
+        <p:nvSpPr>
+          <p:cNvPr id="2" name="Nadpis 1">
+            <a:extLst>
+              <a:ext uri="{FF2B5EF4-FFF2-40B4-BE49-F238E27FC236}">
+                <a16:creationId xmlns:a16="http://schemas.microsoft.com/office/drawing/2014/main" id="{E8464A1D-A422-4A76-ADE6-85093306AC18}"/>
+              </a:ext>
+            </a:extLst>
+          </p:cNvPr>
+          <p:cNvSpPr>
+            <a:spLocks noGrp="1"/>
+          </p:cNvSpPr>
+          <p:nvPr>
+            <p:ph type="title"/>
+          </p:nvPr>
+        </p:nvSpPr>
+        <p:spPr>
+          <a:xfrm>
+            <a:off x="676746" y="609600"/>
+            <a:ext cx="3940224" cy="1320800"/>
+          </a:xfrm>
+        </p:spPr>
+        <p:txBody>
+          <a:bodyPr anchor="ctr">
+            <a:normAutofit/>
+          </a:bodyPr>
+          <a:lstStyle/>
+          <a:p>
+            <a:r>
+              <a:rPr lang="cs-CZ" dirty="0"/>
+              <a:t>Vývojový diagram</a:t>
+            </a:r>
+          </a:p>
+        </p:txBody>
+      </p:sp>
+      <p:sp>
+        <p:nvSpPr>
+          <p:cNvPr id="8" name="Content Placeholder 7">
+            <a:extLst>
+              <a:ext uri="{FF2B5EF4-FFF2-40B4-BE49-F238E27FC236}">
+                <a16:creationId xmlns:a16="http://schemas.microsoft.com/office/drawing/2014/main" id="{E3C18629-8A46-4616-8E90-159284D44756}"/>
+              </a:ext>
+            </a:extLst>
+          </p:cNvPr>
+          <p:cNvSpPr>
+            <a:spLocks noGrp="1"/>
+          </p:cNvSpPr>
+          <p:nvPr>
+            <p:ph idx="1"/>
+          </p:nvPr>
+        </p:nvSpPr>
+        <p:spPr>
+          <a:xfrm>
+            <a:off x="685167" y="2160589"/>
+            <a:ext cx="3720916" cy="4240211"/>
+          </a:xfrm>
+        </p:spPr>
+        <p:txBody>
+          <a:bodyPr>
+            <a:normAutofit/>
+          </a:bodyPr>
+          <a:lstStyle/>
+          <a:p>
+            <a:r>
+              <a:rPr lang="cs-CZ" dirty="0"/>
+              <a:t>Vždy obsahuje právě jeden začátek a konec</a:t>
+            </a:r>
+          </a:p>
+          <a:p>
+            <a:r>
+              <a:rPr lang="cs-CZ" dirty="0"/>
+              <a:t>Šipky nám pomáhají ve čtení toku programu</a:t>
+            </a:r>
+          </a:p>
+          <a:p>
+            <a:r>
+              <a:rPr lang="cs-CZ" dirty="0"/>
+              <a:t>Obsahem rozhodovacích podmínek jsou výrazy, o kterých lze říci zda jsou pravdivé</a:t>
+            </a:r>
+          </a:p>
+          <a:p>
+            <a:r>
+              <a:rPr lang="cs-CZ" dirty="0"/>
+              <a:t>Nejlépe užít výrazu stylu:</a:t>
+            </a:r>
+            <a:br>
+              <a:rPr lang="cs-CZ" dirty="0"/>
+            </a:br>
+            <a:r>
+              <a:rPr lang="cs-CZ" b="1" dirty="0"/>
+              <a:t>X &lt; Y </a:t>
+            </a:r>
+            <a:r>
+              <a:rPr lang="cs-CZ" dirty="0"/>
+              <a:t>nebo </a:t>
+            </a:r>
+            <a:r>
+              <a:rPr lang="cs-CZ" b="1" dirty="0"/>
+              <a:t>A == B </a:t>
+            </a:r>
+            <a:r>
+              <a:rPr lang="cs-CZ" dirty="0"/>
+              <a:t>apod.</a:t>
+            </a:r>
+          </a:p>
+          <a:p>
+            <a:r>
+              <a:rPr lang="cs-CZ" dirty="0"/>
+              <a:t>Proměnné, které v průběhu použijeme uvádíme až v momentě použití</a:t>
+            </a:r>
+            <a:endParaRPr lang="en-US" dirty="0"/>
+          </a:p>
+        </p:txBody>
+      </p:sp>
+      <p:pic>
+        <p:nvPicPr>
+          <p:cNvPr id="6" name="Zástupný obsah 4" descr="Obsah obrázku text, mapa&#10;&#10;Popis byl vytvořen automaticky">
+            <a:extLst>
+              <a:ext uri="{FF2B5EF4-FFF2-40B4-BE49-F238E27FC236}">
+                <a16:creationId xmlns:a16="http://schemas.microsoft.com/office/drawing/2014/main" id="{4755E660-CBDE-4990-82AC-939DAD819740}"/>
+              </a:ext>
+            </a:extLst>
+          </p:cNvPr>
+          <p:cNvPicPr>
+            <a:picLocks noChangeAspect="1"/>
+          </p:cNvPicPr>
+          <p:nvPr/>
+        </p:nvPicPr>
+        <p:blipFill>
+          <a:blip r:embed="rId2"/>
+          <a:stretch>
+            <a:fillRect/>
+          </a:stretch>
+        </p:blipFill>
+        <p:spPr>
+          <a:xfrm>
+            <a:off x="4616970" y="0"/>
+            <a:ext cx="6964100" cy="6858000"/>
+          </a:xfrm>
+          <a:prstGeom prst="rect">
+            <a:avLst/>
+          </a:prstGeom>
+        </p:spPr>
+      </p:pic>
+    </p:spTree>
+    <p:extLst>
+      <p:ext uri="{BB962C8B-B14F-4D97-AF65-F5344CB8AC3E}">
+        <p14:creationId xmlns:p14="http://schemas.microsoft.com/office/powerpoint/2010/main" val="4158485935"/>
+      </p:ext>
+    </p:extLst>
+  </p:cSld>
+  <p:clrMapOvr>
+    <a:masterClrMapping/>
+  </p:clrMapOvr>
+</p:sld>
+</file>
+
+<file path=ppt/slides/slide12.xml><?xml version="1.0" encoding="utf-8"?>
+<p:sld xmlns:a="http://schemas.openxmlformats.org/drawingml/2006/main" xmlns:r="http://schemas.openxmlformats.org/officeDocument/2006/relationships" xmlns:p="http://schemas.openxmlformats.org/presentationml/2006/main">
+  <p:cSld>
+    <p:spTree>
+      <p:nvGrpSpPr>
+        <p:cNvPr id="1" name=""/>
+        <p:cNvGrpSpPr/>
+        <p:nvPr/>
+      </p:nvGrpSpPr>
+      <p:grpSpPr>
+        <a:xfrm>
+          <a:off x="0" y="0"/>
+          <a:ext cx="0" cy="0"/>
+          <a:chOff x="0" y="0"/>
+          <a:chExt cx="0" cy="0"/>
+        </a:xfrm>
+      </p:grpSpPr>
+      <p:sp>
+        <p:nvSpPr>
+          <p:cNvPr id="2" name="Nadpis 1">
+            <a:extLst>
+              <a:ext uri="{FF2B5EF4-FFF2-40B4-BE49-F238E27FC236}">
                 <a16:creationId xmlns:a16="http://schemas.microsoft.com/office/drawing/2014/main" id="{D9ADF5CE-35F5-45D1-868C-F97968A318C7}"/>
               </a:ext>
             </a:extLst>
@@ -6037,7 +6362,7 @@
 </p:sld>
 </file>
 
-<file path=ppt/slides/slide11.xml><?xml version="1.0" encoding="utf-8"?>
+<file path=ppt/slides/slide13.xml><?xml version="1.0" encoding="utf-8"?>
 <p:sld xmlns:a="http://schemas.openxmlformats.org/drawingml/2006/main" xmlns:r="http://schemas.openxmlformats.org/officeDocument/2006/relationships" xmlns:p="http://schemas.openxmlformats.org/presentationml/2006/main">
   <p:cSld>
     <p:spTree>
@@ -8064,7 +8389,7 @@
           <p:cNvPr id="2" name="Nadpis 1">
             <a:extLst>
               <a:ext uri="{FF2B5EF4-FFF2-40B4-BE49-F238E27FC236}">
-                <a16:creationId xmlns:a16="http://schemas.microsoft.com/office/drawing/2014/main" id="{37AAA5BF-9F6F-4EEB-8322-5BB9000BE3B0}"/>
+                <a16:creationId xmlns:a16="http://schemas.microsoft.com/office/drawing/2014/main" id="{7745C7FD-840A-4FAA-8E60-E90AB65E8B26}"/>
               </a:ext>
             </a:extLst>
           </p:cNvPr>
@@ -8078,7 +8403,7 @@
         <p:spPr>
           <a:xfrm>
             <a:off x="677334" y="609600"/>
-            <a:ext cx="8596668" cy="769034"/>
+            <a:ext cx="8596668" cy="698695"/>
           </a:xfrm>
         </p:spPr>
         <p:txBody>
@@ -8087,7 +8412,7 @@
           <a:p>
             <a:r>
               <a:rPr lang="cs-CZ" dirty="0"/>
-              <a:t>Postup vytváření algoritmu</a:t>
+              <a:t>Struktury</a:t>
             </a:r>
           </a:p>
         </p:txBody>
@@ -8097,7 +8422,7 @@
           <p:cNvPr id="3" name="Zástupný obsah 2">
             <a:extLst>
               <a:ext uri="{FF2B5EF4-FFF2-40B4-BE49-F238E27FC236}">
-                <a16:creationId xmlns:a16="http://schemas.microsoft.com/office/drawing/2014/main" id="{2E934FDF-6B31-4734-B2DC-B4449C6B75BA}"/>
+                <a16:creationId xmlns:a16="http://schemas.microsoft.com/office/drawing/2014/main" id="{3C8C60DC-325E-44A7-A349-1D661CD9A6A9}"/>
               </a:ext>
             </a:extLst>
           </p:cNvPr>
@@ -8110,86 +8435,102 @@
         </p:nvSpPr>
         <p:spPr>
           <a:xfrm>
-            <a:off x="677334" y="1688123"/>
-            <a:ext cx="8596668" cy="4353239"/>
+            <a:off x="677334" y="1519311"/>
+            <a:ext cx="8596668" cy="4522051"/>
           </a:xfrm>
         </p:spPr>
         <p:txBody>
-          <a:bodyPr>
-            <a:normAutofit/>
-          </a:bodyPr>
-          <a:lstStyle/>
-          <a:p>
-            <a:r>
-              <a:rPr lang="cs-CZ" dirty="0"/>
-              <a:t>Formulace problému</a:t>
+          <a:bodyPr/>
+          <a:lstStyle/>
+          <a:p>
+            <a:r>
+              <a:rPr lang="cs-CZ" dirty="0"/>
+              <a:t>Hodnotový typ, který zapouzdřuje jiné hodnoty</a:t>
+            </a:r>
+          </a:p>
+          <a:p>
+            <a:r>
+              <a:rPr lang="cs-CZ" dirty="0"/>
+              <a:t>Vhodné pro reprezentaci jednoduchých objektů</a:t>
+            </a:r>
+          </a:p>
+          <a:p>
+            <a:r>
+              <a:rPr lang="cs-CZ" dirty="0"/>
+              <a:t>Nemají zbytečnou složitost oproti objektům vytvořené z třídy</a:t>
+            </a:r>
+          </a:p>
+          <a:p>
+            <a:r>
+              <a:rPr lang="cs-CZ" dirty="0"/>
+              <a:t>Výhodou je vyšší rychlost při manipulaci oproti třídám</a:t>
+            </a:r>
+          </a:p>
+          <a:p>
+            <a:r>
+              <a:rPr lang="cs-CZ" dirty="0"/>
+              <a:t>Pro získání a úpravu hodnot jednotlivých položek struktur využíváme příslušných funkcí – </a:t>
+            </a:r>
+            <a:r>
+              <a:rPr lang="cs-CZ" b="1" dirty="0" err="1"/>
+              <a:t>get</a:t>
+            </a:r>
+            <a:r>
+              <a:rPr lang="cs-CZ" dirty="0"/>
+              <a:t>,</a:t>
+            </a:r>
+            <a:r>
+              <a:rPr lang="cs-CZ" b="1" dirty="0"/>
+              <a:t> set</a:t>
             </a:r>
           </a:p>
           <a:p>
             <a:pPr lvl="1"/>
             <a:r>
               <a:rPr lang="cs-CZ" dirty="0"/>
-              <a:t>Formulace požadavků, určení vstupů/výstupu a požadavků na přesnost</a:t>
-            </a:r>
-          </a:p>
-          <a:p>
-            <a:r>
-              <a:rPr lang="cs-CZ" dirty="0"/>
-              <a:t>Analýza úlohy</a:t>
-            </a:r>
-          </a:p>
-          <a:p>
-            <a:pPr lvl="1"/>
-            <a:r>
-              <a:rPr lang="cs-CZ" dirty="0"/>
-              <a:t>Ověření řešitelnosti a počtu řešení dle zadaných vstupů</a:t>
-            </a:r>
-          </a:p>
-          <a:p>
-            <a:r>
-              <a:rPr lang="cs-CZ" dirty="0"/>
-              <a:t>Vytvoření algoritmu</a:t>
-            </a:r>
-          </a:p>
-          <a:p>
-            <a:pPr lvl="1"/>
-            <a:r>
-              <a:rPr lang="cs-CZ" dirty="0"/>
-              <a:t>Sestavení sledu operací, které vedou k požadovanému výsledku</a:t>
-            </a:r>
-          </a:p>
-          <a:p>
-            <a:r>
-              <a:rPr lang="cs-CZ" dirty="0"/>
-              <a:t>Sestavení programu</a:t>
-            </a:r>
-          </a:p>
-          <a:p>
-            <a:pPr lvl="1"/>
-            <a:r>
-              <a:rPr lang="cs-CZ" dirty="0"/>
-              <a:t>Vytvoření zdrojového kódu v příslušném programovacím jazyce</a:t>
-            </a:r>
-          </a:p>
-          <a:p>
-            <a:r>
-              <a:rPr lang="cs-CZ" dirty="0"/>
-              <a:t>Odladění programu</a:t>
-            </a:r>
-          </a:p>
-          <a:p>
-            <a:pPr lvl="1"/>
-            <a:r>
-              <a:rPr lang="cs-CZ" dirty="0"/>
-              <a:t>Odstraňování logických a syntaktických chyb v programu</a:t>
-            </a:r>
+              <a:t>Položky struktury musí začínat velkým písmenem pro odlišení od proměnných</a:t>
+            </a:r>
+          </a:p>
+          <a:p>
+            <a:r>
+              <a:rPr lang="cs-CZ" dirty="0"/>
+              <a:t>Oproti proměnné nemáme možnost nejprve strukturu deklarovat a následně ji přiřadit hodnotu – iniciální hodnota je </a:t>
+            </a:r>
+            <a:r>
+              <a:rPr lang="cs-CZ"/>
+              <a:t>vložena konstruktorem</a:t>
+            </a:r>
+            <a:endParaRPr lang="cs-CZ" dirty="0"/>
+          </a:p>
+          <a:p>
+            <a:r>
+              <a:rPr lang="cs-CZ" dirty="0"/>
+              <a:t>Pokud chceme vytvořit proměnnou, která bude obsahovat strukturu využijeme tzv. </a:t>
+            </a:r>
+            <a:r>
+              <a:rPr lang="cs-CZ" b="1" dirty="0"/>
+              <a:t>konstruktoru</a:t>
+            </a:r>
+            <a:r>
+              <a:rPr lang="cs-CZ" dirty="0"/>
+              <a:t>, který nám strukturu vytvoří a vyplní příslušnými hodnotami</a:t>
+            </a:r>
+          </a:p>
+          <a:p>
+            <a:r>
+              <a:rPr lang="cs-CZ" dirty="0"/>
+              <a:t>Struktury mohou mít své vlastní vnitřní funkce</a:t>
+            </a:r>
+          </a:p>
+          <a:p>
+            <a:endParaRPr lang="cs-CZ" dirty="0"/>
           </a:p>
         </p:txBody>
       </p:sp>
     </p:spTree>
     <p:extLst>
       <p:ext uri="{BB962C8B-B14F-4D97-AF65-F5344CB8AC3E}">
-        <p14:creationId xmlns:p14="http://schemas.microsoft.com/office/powerpoint/2010/main" val="4193283823"/>
+        <p14:creationId xmlns:p14="http://schemas.microsoft.com/office/powerpoint/2010/main" val="3247471681"/>
       </p:ext>
     </p:extLst>
   </p:cSld>
@@ -8221,7 +8562,7 @@
           <p:cNvPr id="2" name="Nadpis 1">
             <a:extLst>
               <a:ext uri="{FF2B5EF4-FFF2-40B4-BE49-F238E27FC236}">
-                <a16:creationId xmlns:a16="http://schemas.microsoft.com/office/drawing/2014/main" id="{B787E4E9-AD40-4F51-B9CF-ABA3E7FFAB1B}"/>
+                <a16:creationId xmlns:a16="http://schemas.microsoft.com/office/drawing/2014/main" id="{7745C7FD-840A-4FAA-8E60-E90AB65E8B26}"/>
               </a:ext>
             </a:extLst>
           </p:cNvPr>
@@ -8235,7 +8576,7 @@
         <p:spPr>
           <a:xfrm>
             <a:off x="677334" y="609600"/>
-            <a:ext cx="8596668" cy="829456"/>
+            <a:ext cx="8596668" cy="698695"/>
           </a:xfrm>
         </p:spPr>
         <p:txBody>
@@ -8244,247 +8585,119 @@
           <a:p>
             <a:r>
               <a:rPr lang="cs-CZ" dirty="0"/>
-              <a:t>Přehled používaných symbolů</a:t>
-            </a:r>
-          </a:p>
-        </p:txBody>
-      </p:sp>
-      <p:pic>
-        <p:nvPicPr>
-          <p:cNvPr id="4" name="Zástupný obsah 4">
+              <a:t>Enumerace</a:t>
+            </a:r>
+          </a:p>
+        </p:txBody>
+      </p:sp>
+      <p:sp>
+        <p:nvSpPr>
+          <p:cNvPr id="3" name="Zástupný obsah 2">
             <a:extLst>
               <a:ext uri="{FF2B5EF4-FFF2-40B4-BE49-F238E27FC236}">
-                <a16:creationId xmlns:a16="http://schemas.microsoft.com/office/drawing/2014/main" id="{3F24D363-0852-44A5-8A3D-C27141964298}"/>
+                <a16:creationId xmlns:a16="http://schemas.microsoft.com/office/drawing/2014/main" id="{3C8C60DC-325E-44A7-A349-1D661CD9A6A9}"/>
               </a:ext>
             </a:extLst>
           </p:cNvPr>
-          <p:cNvPicPr>
-            <a:picLocks noGrp="1" noChangeAspect="1"/>
-          </p:cNvPicPr>
+          <p:cNvSpPr>
+            <a:spLocks noGrp="1"/>
+          </p:cNvSpPr>
           <p:nvPr>
             <p:ph idx="1"/>
           </p:nvPr>
-        </p:nvPicPr>
-        <p:blipFill>
-          <a:blip r:embed="rId2"/>
-          <a:stretch>
-            <a:fillRect/>
-          </a:stretch>
-        </p:blipFill>
+        </p:nvSpPr>
         <p:spPr>
           <a:xfrm>
-            <a:off x="1482693" y="1439056"/>
-            <a:ext cx="6985949" cy="5043874"/>
+            <a:off x="677334" y="1519311"/>
+            <a:ext cx="8596668" cy="4522051"/>
           </a:xfrm>
         </p:spPr>
-      </p:pic>
-      <p:sp>
-        <p:nvSpPr>
-          <p:cNvPr id="5" name="Šipka: doleva 4">
+        <p:txBody>
+          <a:bodyPr/>
+          <a:lstStyle/>
+          <a:p>
+            <a:r>
+              <a:rPr lang="cs-CZ" dirty="0"/>
+              <a:t>= typ hodnoty definovaný sadou pojmenovaných konstant reprezentované jako celočíselná hodnota </a:t>
+            </a:r>
+            <a:r>
+              <a:rPr lang="cs-CZ" dirty="0" err="1"/>
+              <a:t>int</a:t>
+            </a:r>
+            <a:endParaRPr lang="cs-CZ" dirty="0"/>
+          </a:p>
+          <a:p>
+            <a:r>
+              <a:rPr lang="cs-CZ" dirty="0"/>
+              <a:t>Vhodné pokud chceme vytvořit výčet hodnot, které se budou v programu objevovat</a:t>
+            </a:r>
+          </a:p>
+          <a:p>
+            <a:r>
+              <a:rPr lang="cs-CZ" dirty="0"/>
+              <a:t>Přestože si jednotlivé proměnné pojmenujeme podle naší potřeby, kompilátor je čte jako hodnoty </a:t>
+            </a:r>
+            <a:r>
+              <a:rPr lang="cs-CZ" dirty="0" err="1"/>
+              <a:t>int</a:t>
+            </a:r>
+            <a:r>
+              <a:rPr lang="cs-CZ" dirty="0"/>
+              <a:t> – pokud skutečně chceme číselnou hodnotu je nutné provést konverzi </a:t>
+            </a:r>
+            <a:r>
+              <a:rPr lang="cs-CZ" b="1" dirty="0"/>
+              <a:t>(</a:t>
+            </a:r>
+            <a:r>
+              <a:rPr lang="cs-CZ" b="1" dirty="0" err="1"/>
+              <a:t>int</a:t>
+            </a:r>
+            <a:r>
+              <a:rPr lang="cs-CZ" b="1" dirty="0"/>
+              <a:t>) </a:t>
+            </a:r>
+            <a:r>
+              <a:rPr lang="cs-CZ" b="1" dirty="0" err="1"/>
+              <a:t>Den.Pondeli</a:t>
+            </a:r>
+            <a:endParaRPr lang="cs-CZ" b="1" dirty="0"/>
+          </a:p>
+          <a:p>
+            <a:endParaRPr lang="cs-CZ" dirty="0"/>
+          </a:p>
+          <a:p>
+            <a:r>
+              <a:rPr lang="cs-CZ" dirty="0"/>
+              <a:t>Hodnoty jsou podle pořadí reprezentovány číslicemi od 0</a:t>
+            </a:r>
+          </a:p>
+          <a:p>
+            <a:r>
+              <a:rPr lang="cs-CZ" dirty="0"/>
+              <a:t>Pokud chceme můžeme reprezentované hodnoty změnit případně posunout</a:t>
+            </a:r>
+          </a:p>
+          <a:p>
+            <a:endParaRPr lang="cs-CZ" dirty="0"/>
+          </a:p>
+          <a:p>
+            <a:r>
+              <a:rPr lang="cs-CZ" dirty="0"/>
+              <a:t>Volání výčtového typu: </a:t>
+            </a:r>
+          </a:p>
+          <a:p>
+            <a:endParaRPr lang="cs-CZ" dirty="0"/>
+          </a:p>
+        </p:txBody>
+      </p:sp>
+      <p:pic>
+        <p:nvPicPr>
+          <p:cNvPr id="4" name="Obrázek 3">
             <a:extLst>
               <a:ext uri="{FF2B5EF4-FFF2-40B4-BE49-F238E27FC236}">
-                <a16:creationId xmlns:a16="http://schemas.microsoft.com/office/drawing/2014/main" id="{55657F4F-F11E-4ADC-A9DF-E4CF2AF41871}"/>
-              </a:ext>
-            </a:extLst>
-          </p:cNvPr>
-          <p:cNvSpPr/>
-          <p:nvPr/>
-        </p:nvSpPr>
-        <p:spPr>
-          <a:xfrm>
-            <a:off x="8468642" y="1772313"/>
-            <a:ext cx="2509687" cy="1459120"/>
-          </a:xfrm>
-          <a:prstGeom prst="leftArrow">
-            <a:avLst/>
-          </a:prstGeom>
-        </p:spPr>
-        <p:style>
-          <a:lnRef idx="2">
-            <a:schemeClr val="accent1">
-              <a:shade val="50000"/>
-            </a:schemeClr>
-          </a:lnRef>
-          <a:fillRef idx="1">
-            <a:schemeClr val="accent1"/>
-          </a:fillRef>
-          <a:effectRef idx="0">
-            <a:schemeClr val="accent1"/>
-          </a:effectRef>
-          <a:fontRef idx="minor">
-            <a:schemeClr val="lt1"/>
-          </a:fontRef>
-        </p:style>
-        <p:txBody>
-          <a:bodyPr rtlCol="0" anchor="ctr"/>
-          <a:lstStyle/>
-          <a:p>
-            <a:pPr algn="ctr"/>
-            <a:r>
-              <a:rPr lang="cs-CZ" dirty="0"/>
-              <a:t>Používáme i pro vstupní instrukce</a:t>
-            </a:r>
-          </a:p>
-        </p:txBody>
-      </p:sp>
-    </p:spTree>
-    <p:extLst>
-      <p:ext uri="{BB962C8B-B14F-4D97-AF65-F5344CB8AC3E}">
-        <p14:creationId xmlns:p14="http://schemas.microsoft.com/office/powerpoint/2010/main" val="2761015398"/>
-      </p:ext>
-    </p:extLst>
-  </p:cSld>
-  <p:clrMapOvr>
-    <a:masterClrMapping/>
-  </p:clrMapOvr>
-</p:sld>
-</file>
-
-<file path=ppt/slides/slide9.xml><?xml version="1.0" encoding="utf-8"?>
-<p:sld xmlns:a="http://schemas.openxmlformats.org/drawingml/2006/main" xmlns:r="http://schemas.openxmlformats.org/officeDocument/2006/relationships" xmlns:p="http://schemas.openxmlformats.org/presentationml/2006/main">
-  <p:cSld>
-    <p:bg>
-      <p:bgPr>
-        <a:solidFill>
-          <a:schemeClr val="bg1"/>
-        </a:solidFill>
-        <a:effectLst/>
-      </p:bgPr>
-    </p:bg>
-    <p:spTree>
-      <p:nvGrpSpPr>
-        <p:cNvPr id="1" name=""/>
-        <p:cNvGrpSpPr/>
-        <p:nvPr/>
-      </p:nvGrpSpPr>
-      <p:grpSpPr>
-        <a:xfrm>
-          <a:off x="0" y="0"/>
-          <a:ext cx="0" cy="0"/>
-          <a:chOff x="0" y="0"/>
-          <a:chExt cx="0" cy="0"/>
-        </a:xfrm>
-      </p:grpSpPr>
-      <p:sp>
-        <p:nvSpPr>
-          <p:cNvPr id="2" name="Nadpis 1">
-            <a:extLst>
-              <a:ext uri="{FF2B5EF4-FFF2-40B4-BE49-F238E27FC236}">
-                <a16:creationId xmlns:a16="http://schemas.microsoft.com/office/drawing/2014/main" id="{E8464A1D-A422-4A76-ADE6-85093306AC18}"/>
-              </a:ext>
-            </a:extLst>
-          </p:cNvPr>
-          <p:cNvSpPr>
-            <a:spLocks noGrp="1"/>
-          </p:cNvSpPr>
-          <p:nvPr>
-            <p:ph type="title"/>
-          </p:nvPr>
-        </p:nvSpPr>
-        <p:spPr>
-          <a:xfrm>
-            <a:off x="676746" y="609600"/>
-            <a:ext cx="3940224" cy="1320800"/>
-          </a:xfrm>
-        </p:spPr>
-        <p:txBody>
-          <a:bodyPr anchor="ctr">
-            <a:normAutofit/>
-          </a:bodyPr>
-          <a:lstStyle/>
-          <a:p>
-            <a:r>
-              <a:rPr lang="cs-CZ" dirty="0"/>
-              <a:t>Vývojový diagram</a:t>
-            </a:r>
-          </a:p>
-        </p:txBody>
-      </p:sp>
-      <p:sp>
-        <p:nvSpPr>
-          <p:cNvPr id="8" name="Content Placeholder 7">
-            <a:extLst>
-              <a:ext uri="{FF2B5EF4-FFF2-40B4-BE49-F238E27FC236}">
-                <a16:creationId xmlns:a16="http://schemas.microsoft.com/office/drawing/2014/main" id="{E3C18629-8A46-4616-8E90-159284D44756}"/>
-              </a:ext>
-            </a:extLst>
-          </p:cNvPr>
-          <p:cNvSpPr>
-            <a:spLocks noGrp="1"/>
-          </p:cNvSpPr>
-          <p:nvPr>
-            <p:ph idx="1"/>
-          </p:nvPr>
-        </p:nvSpPr>
-        <p:spPr>
-          <a:xfrm>
-            <a:off x="685167" y="2160589"/>
-            <a:ext cx="3720916" cy="4240211"/>
-          </a:xfrm>
-        </p:spPr>
-        <p:txBody>
-          <a:bodyPr>
-            <a:normAutofit/>
-          </a:bodyPr>
-          <a:lstStyle/>
-          <a:p>
-            <a:r>
-              <a:rPr lang="cs-CZ" dirty="0"/>
-              <a:t>Vždy obsahuje právě jeden začátek a konec</a:t>
-            </a:r>
-          </a:p>
-          <a:p>
-            <a:r>
-              <a:rPr lang="cs-CZ" dirty="0"/>
-              <a:t>Šipky nám pomáhají ve čtení toku programu</a:t>
-            </a:r>
-          </a:p>
-          <a:p>
-            <a:r>
-              <a:rPr lang="cs-CZ" dirty="0"/>
-              <a:t>Obsahem rozhodovacích podmínek jsou výrazy, o kterých lze říci zda jsou pravdivé</a:t>
-            </a:r>
-          </a:p>
-          <a:p>
-            <a:r>
-              <a:rPr lang="cs-CZ" dirty="0"/>
-              <a:t>Nejlépe užít výrazu stylu:</a:t>
-            </a:r>
-            <a:br>
-              <a:rPr lang="cs-CZ" dirty="0"/>
-            </a:br>
-            <a:r>
-              <a:rPr lang="cs-CZ" b="1" dirty="0"/>
-              <a:t>X &lt; Y </a:t>
-            </a:r>
-            <a:r>
-              <a:rPr lang="cs-CZ" dirty="0"/>
-              <a:t>nebo </a:t>
-            </a:r>
-            <a:r>
-              <a:rPr lang="cs-CZ" b="1" dirty="0"/>
-              <a:t>A == B </a:t>
-            </a:r>
-            <a:r>
-              <a:rPr lang="cs-CZ" dirty="0"/>
-              <a:t>apod.</a:t>
-            </a:r>
-          </a:p>
-          <a:p>
-            <a:r>
-              <a:rPr lang="cs-CZ" dirty="0"/>
-              <a:t>Proměnné, které v průběhu použijeme uvádíme až v momentě použití</a:t>
-            </a:r>
-            <a:endParaRPr lang="en-US" dirty="0"/>
-          </a:p>
-        </p:txBody>
-      </p:sp>
-      <p:pic>
-        <p:nvPicPr>
-          <p:cNvPr id="6" name="Zástupný obsah 4" descr="Obsah obrázku text, mapa&#10;&#10;Popis byl vytvořen automaticky">
-            <a:extLst>
-              <a:ext uri="{FF2B5EF4-FFF2-40B4-BE49-F238E27FC236}">
-                <a16:creationId xmlns:a16="http://schemas.microsoft.com/office/drawing/2014/main" id="{4755E660-CBDE-4990-82AC-939DAD819740}"/>
+                <a16:creationId xmlns:a16="http://schemas.microsoft.com/office/drawing/2014/main" id="{8D999AD4-499F-4440-849A-7EBFBDB1A656}"/>
               </a:ext>
             </a:extLst>
           </p:cNvPr>
@@ -8501,8 +8714,68 @@
         </p:blipFill>
         <p:spPr>
           <a:xfrm>
-            <a:off x="4616970" y="0"/>
-            <a:ext cx="6964100" cy="6858000"/>
+            <a:off x="1045142" y="3780336"/>
+            <a:ext cx="7523427" cy="347663"/>
+          </a:xfrm>
+          <a:prstGeom prst="rect">
+            <a:avLst/>
+          </a:prstGeom>
+        </p:spPr>
+      </p:pic>
+      <p:pic>
+        <p:nvPicPr>
+          <p:cNvPr id="5" name="Obrázek 4">
+            <a:extLst>
+              <a:ext uri="{FF2B5EF4-FFF2-40B4-BE49-F238E27FC236}">
+                <a16:creationId xmlns:a16="http://schemas.microsoft.com/office/drawing/2014/main" id="{1E89F55A-08E5-43A4-89D3-F80CAC884FBB}"/>
+              </a:ext>
+            </a:extLst>
+          </p:cNvPr>
+          <p:cNvPicPr>
+            <a:picLocks noChangeAspect="1"/>
+          </p:cNvPicPr>
+          <p:nvPr/>
+        </p:nvPicPr>
+        <p:blipFill>
+          <a:blip r:embed="rId3"/>
+          <a:stretch>
+            <a:fillRect/>
+          </a:stretch>
+        </p:blipFill>
+        <p:spPr>
+          <a:xfrm>
+            <a:off x="1777167" y="5003213"/>
+            <a:ext cx="6396999" cy="347663"/>
+          </a:xfrm>
+          <a:prstGeom prst="rect">
+            <a:avLst/>
+          </a:prstGeom>
+        </p:spPr>
+      </p:pic>
+      <p:pic>
+        <p:nvPicPr>
+          <p:cNvPr id="6" name="Obrázek 5">
+            <a:extLst>
+              <a:ext uri="{FF2B5EF4-FFF2-40B4-BE49-F238E27FC236}">
+                <a16:creationId xmlns:a16="http://schemas.microsoft.com/office/drawing/2014/main" id="{0BD9BC9E-2634-4A81-A17F-3661809BC2E0}"/>
+              </a:ext>
+            </a:extLst>
+          </p:cNvPr>
+          <p:cNvPicPr>
+            <a:picLocks noChangeAspect="1"/>
+          </p:cNvPicPr>
+          <p:nvPr/>
+        </p:nvPicPr>
+        <p:blipFill>
+          <a:blip r:embed="rId4"/>
+          <a:stretch>
+            <a:fillRect/>
+          </a:stretch>
+        </p:blipFill>
+        <p:spPr>
+          <a:xfrm>
+            <a:off x="3629415" y="5446869"/>
+            <a:ext cx="1469662" cy="347662"/>
           </a:xfrm>
           <a:prstGeom prst="rect">
             <a:avLst/>
@@ -8512,7 +8785,164 @@
     </p:spTree>
     <p:extLst>
       <p:ext uri="{BB962C8B-B14F-4D97-AF65-F5344CB8AC3E}">
-        <p14:creationId xmlns:p14="http://schemas.microsoft.com/office/powerpoint/2010/main" val="4158485935"/>
+        <p14:creationId xmlns:p14="http://schemas.microsoft.com/office/powerpoint/2010/main" val="1384085839"/>
+      </p:ext>
+    </p:extLst>
+  </p:cSld>
+  <p:clrMapOvr>
+    <a:masterClrMapping/>
+  </p:clrMapOvr>
+</p:sld>
+</file>
+
+<file path=ppt/slides/slide9.xml><?xml version="1.0" encoding="utf-8"?>
+<p:sld xmlns:a="http://schemas.openxmlformats.org/drawingml/2006/main" xmlns:r="http://schemas.openxmlformats.org/officeDocument/2006/relationships" xmlns:p="http://schemas.openxmlformats.org/presentationml/2006/main">
+  <p:cSld>
+    <p:spTree>
+      <p:nvGrpSpPr>
+        <p:cNvPr id="1" name=""/>
+        <p:cNvGrpSpPr/>
+        <p:nvPr/>
+      </p:nvGrpSpPr>
+      <p:grpSpPr>
+        <a:xfrm>
+          <a:off x="0" y="0"/>
+          <a:ext cx="0" cy="0"/>
+          <a:chOff x="0" y="0"/>
+          <a:chExt cx="0" cy="0"/>
+        </a:xfrm>
+      </p:grpSpPr>
+      <p:sp>
+        <p:nvSpPr>
+          <p:cNvPr id="2" name="Nadpis 1">
+            <a:extLst>
+              <a:ext uri="{FF2B5EF4-FFF2-40B4-BE49-F238E27FC236}">
+                <a16:creationId xmlns:a16="http://schemas.microsoft.com/office/drawing/2014/main" id="{37AAA5BF-9F6F-4EEB-8322-5BB9000BE3B0}"/>
+              </a:ext>
+            </a:extLst>
+          </p:cNvPr>
+          <p:cNvSpPr>
+            <a:spLocks noGrp="1"/>
+          </p:cNvSpPr>
+          <p:nvPr>
+            <p:ph type="title"/>
+          </p:nvPr>
+        </p:nvSpPr>
+        <p:spPr>
+          <a:xfrm>
+            <a:off x="677334" y="609600"/>
+            <a:ext cx="8596668" cy="769034"/>
+          </a:xfrm>
+        </p:spPr>
+        <p:txBody>
+          <a:bodyPr/>
+          <a:lstStyle/>
+          <a:p>
+            <a:r>
+              <a:rPr lang="cs-CZ" dirty="0"/>
+              <a:t>Postup vytváření algoritmu</a:t>
+            </a:r>
+          </a:p>
+        </p:txBody>
+      </p:sp>
+      <p:sp>
+        <p:nvSpPr>
+          <p:cNvPr id="3" name="Zástupný obsah 2">
+            <a:extLst>
+              <a:ext uri="{FF2B5EF4-FFF2-40B4-BE49-F238E27FC236}">
+                <a16:creationId xmlns:a16="http://schemas.microsoft.com/office/drawing/2014/main" id="{2E934FDF-6B31-4734-B2DC-B4449C6B75BA}"/>
+              </a:ext>
+            </a:extLst>
+          </p:cNvPr>
+          <p:cNvSpPr>
+            <a:spLocks noGrp="1"/>
+          </p:cNvSpPr>
+          <p:nvPr>
+            <p:ph idx="1"/>
+          </p:nvPr>
+        </p:nvSpPr>
+        <p:spPr>
+          <a:xfrm>
+            <a:off x="677334" y="1688123"/>
+            <a:ext cx="8596668" cy="4353239"/>
+          </a:xfrm>
+        </p:spPr>
+        <p:txBody>
+          <a:bodyPr>
+            <a:normAutofit/>
+          </a:bodyPr>
+          <a:lstStyle/>
+          <a:p>
+            <a:r>
+              <a:rPr lang="cs-CZ" dirty="0"/>
+              <a:t>Formulace problému</a:t>
+            </a:r>
+          </a:p>
+          <a:p>
+            <a:pPr lvl="1"/>
+            <a:r>
+              <a:rPr lang="cs-CZ" dirty="0"/>
+              <a:t>Formulace požadavků, určení vstupů/výstupu a požadavků na přesnost</a:t>
+            </a:r>
+          </a:p>
+          <a:p>
+            <a:r>
+              <a:rPr lang="cs-CZ" dirty="0"/>
+              <a:t>Analýza úlohy</a:t>
+            </a:r>
+          </a:p>
+          <a:p>
+            <a:pPr lvl="1"/>
+            <a:r>
+              <a:rPr lang="cs-CZ" dirty="0"/>
+              <a:t>Ověření řešitelnosti a počtu řešení dle zadaných vstupů</a:t>
+            </a:r>
+          </a:p>
+          <a:p>
+            <a:r>
+              <a:rPr lang="cs-CZ" dirty="0"/>
+              <a:t>Vytvoření algoritmu</a:t>
+            </a:r>
+          </a:p>
+          <a:p>
+            <a:pPr lvl="1"/>
+            <a:r>
+              <a:rPr lang="cs-CZ" dirty="0"/>
+              <a:t>Sestavení sledu operací, které vedou k požadovanému výsledku</a:t>
+            </a:r>
+          </a:p>
+          <a:p>
+            <a:r>
+              <a:rPr lang="cs-CZ" dirty="0"/>
+              <a:t>Sestavení programu</a:t>
+            </a:r>
+          </a:p>
+          <a:p>
+            <a:pPr lvl="1"/>
+            <a:r>
+              <a:rPr lang="cs-CZ" dirty="0"/>
+              <a:t>Vytvoření zdrojového kódu v příslušném programovacím jazyce</a:t>
+            </a:r>
+          </a:p>
+          <a:p>
+            <a:r>
+              <a:rPr lang="cs-CZ" dirty="0"/>
+              <a:t>Odladění programu</a:t>
+            </a:r>
+          </a:p>
+          <a:p>
+            <a:pPr lvl="1"/>
+            <a:r>
+              <a:rPr lang="cs-CZ" dirty="0"/>
+              <a:t>Odstraňování logických a syntaktických chyb v programu</a:t>
+            </a:r>
+          </a:p>
+        </p:txBody>
+      </p:sp>
+    </p:spTree>
+    <p:extLst>
+      <p:ext uri="{BB962C8B-B14F-4D97-AF65-F5344CB8AC3E}">
+        <p14:creationId xmlns:p14="http://schemas.microsoft.com/office/powerpoint/2010/main" val="4193283823"/>
       </p:ext>
     </p:extLst>
   </p:cSld>

</xml_diff>